<commit_message>
presentation: + notes for slides
</commit_message>
<xml_diff>
--- a/docs_my/explanatory_note/presentation/Panin_645.pptx
+++ b/docs_my/explanatory_note/presentation/Panin_645.pptx
@@ -823,7 +823,80 @@
               </a:spcAft>
               <a:buNone/>
             </a:pPr>
-            <a:endParaRPr/>
+            <a:r>
+              <a:rPr lang="ru-RU" dirty="0" smtClean="0"/>
+              <a:t>Слайд</a:t>
+            </a:r>
+            <a:r>
+              <a:rPr lang="ru-RU" baseline="0" dirty="0" smtClean="0"/>
+              <a:t> 2. Описание предметной области</a:t>
+            </a:r>
+          </a:p>
+          <a:p>
+            <a:pPr marL="0" lvl="0" indent="0" algn="l" rtl="0">
+              <a:spcBef>
+                <a:spcPts val="0"/>
+              </a:spcBef>
+              <a:spcAft>
+                <a:spcPts val="0"/>
+              </a:spcAft>
+              <a:buNone/>
+            </a:pPr>
+            <a:endParaRPr lang="ru-RU" baseline="0" dirty="0" smtClean="0"/>
+          </a:p>
+          <a:p>
+            <a:pPr marL="0" lvl="0" indent="0" algn="l" rtl="0">
+              <a:spcBef>
+                <a:spcPts val="0"/>
+              </a:spcBef>
+              <a:spcAft>
+                <a:spcPts val="0"/>
+              </a:spcAft>
+              <a:buNone/>
+            </a:pPr>
+            <a:r>
+              <a:rPr lang="ru-RU" dirty="0" smtClean="0"/>
+              <a:t>Залог успеха каждой современной компании – не только приобретение качественного сетевого оборудования, но и регулярное его обслуживание, проверки и мониторинг.</a:t>
+            </a:r>
+          </a:p>
+          <a:p>
+            <a:pPr marL="0" lvl="0" indent="0" algn="l" rtl="0">
+              <a:spcBef>
+                <a:spcPts val="0"/>
+              </a:spcBef>
+              <a:spcAft>
+                <a:spcPts val="0"/>
+              </a:spcAft>
+              <a:buNone/>
+            </a:pPr>
+            <a:endParaRPr lang="ru-RU" dirty="0" smtClean="0"/>
+          </a:p>
+          <a:p>
+            <a:pPr marL="0" lvl="0" indent="0" algn="l" rtl="0">
+              <a:spcBef>
+                <a:spcPts val="0"/>
+              </a:spcBef>
+              <a:spcAft>
+                <a:spcPts val="0"/>
+              </a:spcAft>
+              <a:buNone/>
+            </a:pPr>
+            <a:r>
+              <a:rPr lang="ru-RU" dirty="0" smtClean="0"/>
+              <a:t>Постоянный контроль над оборудованием позволяет максимально оперативно устранять возникающие проблемы, сводя к минимуму время от обнаружения проблемы до её устранения.</a:t>
+            </a:r>
+          </a:p>
+          <a:p>
+            <a:pPr marL="0" lvl="0" indent="0" algn="l" rtl="0">
+              <a:spcBef>
+                <a:spcPts val="0"/>
+              </a:spcBef>
+              <a:spcAft>
+                <a:spcPts val="0"/>
+              </a:spcAft>
+              <a:buNone/>
+            </a:pPr>
+            <a:endParaRPr dirty="0"/>
           </a:p>
         </p:txBody>
       </p:sp>
@@ -927,7 +1000,192 @@
               </a:spcAft>
               <a:buNone/>
             </a:pPr>
-            <a:endParaRPr/>
+            <a:r>
+              <a:rPr lang="ru-RU" dirty="0" smtClean="0"/>
+              <a:t>Слайд 10. </a:t>
+            </a:r>
+            <a:r>
+              <a:rPr lang="en-US" sz="1100" dirty="0" smtClean="0"/>
+              <a:t>D-Link SLA-system</a:t>
+            </a:r>
+            <a:endParaRPr lang="ru-RU" sz="1100" dirty="0" smtClean="0"/>
+          </a:p>
+          <a:p>
+            <a:pPr marL="0" lvl="0" indent="0" algn="l" rtl="0">
+              <a:spcBef>
+                <a:spcPts val="0"/>
+              </a:spcBef>
+              <a:spcAft>
+                <a:spcPts val="0"/>
+              </a:spcAft>
+              <a:buNone/>
+            </a:pPr>
+            <a:endParaRPr lang="ru-RU" sz="1100" dirty="0" smtClean="0"/>
+          </a:p>
+          <a:p>
+            <a:pPr marL="0" lvl="0" indent="0" algn="l" rtl="0">
+              <a:spcBef>
+                <a:spcPts val="0"/>
+              </a:spcBef>
+              <a:spcAft>
+                <a:spcPts val="0"/>
+              </a:spcAft>
+              <a:buNone/>
+            </a:pPr>
+            <a:r>
+              <a:rPr lang="ru-RU" sz="1100" dirty="0" smtClean="0"/>
+              <a:t>Достоинства:</a:t>
+            </a:r>
+          </a:p>
+          <a:p>
+            <a:pPr marL="0" lvl="0" indent="0" algn="l" rtl="0">
+              <a:spcBef>
+                <a:spcPts val="0"/>
+              </a:spcBef>
+              <a:spcAft>
+                <a:spcPts val="0"/>
+              </a:spcAft>
+              <a:buNone/>
+            </a:pPr>
+            <a:r>
+              <a:rPr lang="ru-RU" sz="1100" dirty="0" smtClean="0"/>
+              <a:t>- адекватная стоимость оборудования;</a:t>
+            </a:r>
+          </a:p>
+          <a:p>
+            <a:pPr marL="0" lvl="0" indent="0" algn="l" rtl="0">
+              <a:spcBef>
+                <a:spcPts val="0"/>
+              </a:spcBef>
+              <a:spcAft>
+                <a:spcPts val="0"/>
+              </a:spcAft>
+              <a:buNone/>
+            </a:pPr>
+            <a:r>
+              <a:rPr lang="ru-RU" sz="1100" dirty="0" smtClean="0"/>
+              <a:t>- предустановлено заводом;</a:t>
+            </a:r>
+          </a:p>
+          <a:p>
+            <a:pPr marL="0" lvl="0" indent="0" algn="l" rtl="0">
+              <a:spcBef>
+                <a:spcPts val="0"/>
+              </a:spcBef>
+              <a:spcAft>
+                <a:spcPts val="0"/>
+              </a:spcAft>
+              <a:buNone/>
+            </a:pPr>
+            <a:r>
+              <a:rPr lang="ru-RU" sz="1100" dirty="0" smtClean="0"/>
+              <a:t>- мировая поддержка.</a:t>
+            </a:r>
+          </a:p>
+          <a:p>
+            <a:pPr marL="0" lvl="0" indent="0" algn="l" rtl="0">
+              <a:spcBef>
+                <a:spcPts val="0"/>
+              </a:spcBef>
+              <a:spcAft>
+                <a:spcPts val="0"/>
+              </a:spcAft>
+              <a:buNone/>
+            </a:pPr>
+            <a:endParaRPr lang="ru-RU" sz="1100" dirty="0" smtClean="0"/>
+          </a:p>
+          <a:p>
+            <a:pPr marL="0" lvl="0" indent="0" algn="l" rtl="0">
+              <a:spcBef>
+                <a:spcPts val="0"/>
+              </a:spcBef>
+              <a:spcAft>
+                <a:spcPts val="0"/>
+              </a:spcAft>
+              <a:buNone/>
+            </a:pPr>
+            <a:r>
+              <a:rPr lang="ru-RU" sz="1100" dirty="0" smtClean="0"/>
+              <a:t>Недостатки:</a:t>
+            </a:r>
+          </a:p>
+          <a:p>
+            <a:pPr marL="0" lvl="0" indent="0" algn="l" rtl="0">
+              <a:spcBef>
+                <a:spcPts val="0"/>
+              </a:spcBef>
+              <a:spcAft>
+                <a:spcPts val="0"/>
+              </a:spcAft>
+              <a:buNone/>
+            </a:pPr>
+            <a:r>
+              <a:rPr lang="ru-RU" sz="1100" dirty="0" smtClean="0"/>
+              <a:t>- устаревший пользовательский интерфейс.</a:t>
+            </a:r>
+          </a:p>
+          <a:p>
+            <a:pPr marL="0" lvl="0" indent="0" algn="l" rtl="0">
+              <a:spcBef>
+                <a:spcPts val="0"/>
+              </a:spcBef>
+              <a:spcAft>
+                <a:spcPts val="0"/>
+              </a:spcAft>
+              <a:buNone/>
+            </a:pPr>
+            <a:endParaRPr lang="ru-RU" sz="1100" dirty="0" smtClean="0"/>
+          </a:p>
+          <a:p>
+            <a:pPr marL="0" lvl="0" indent="0" algn="l" rtl="0">
+              <a:spcBef>
+                <a:spcPts val="0"/>
+              </a:spcBef>
+              <a:spcAft>
+                <a:spcPts val="0"/>
+              </a:spcAft>
+              <a:buNone/>
+            </a:pPr>
+            <a:endParaRPr lang="ru-RU" sz="1100" dirty="0" smtClean="0"/>
+          </a:p>
+          <a:p>
+            <a:pPr marL="0" lvl="0" indent="0" algn="l" rtl="0">
+              <a:spcBef>
+                <a:spcPts val="0"/>
+              </a:spcBef>
+              <a:spcAft>
+                <a:spcPts val="0"/>
+              </a:spcAft>
+              <a:buNone/>
+            </a:pPr>
+            <a:endParaRPr lang="ru-RU" dirty="0" smtClean="0"/>
+          </a:p>
+          <a:p>
+            <a:pPr marL="0" lvl="0" indent="0" algn="l" rtl="0">
+              <a:spcBef>
+                <a:spcPts val="0"/>
+              </a:spcBef>
+              <a:spcAft>
+                <a:spcPts val="0"/>
+              </a:spcAft>
+              <a:buNone/>
+            </a:pPr>
+            <a:r>
+              <a:rPr lang="ru-RU" dirty="0" smtClean="0"/>
+              <a:t>Пример пользовательского интерфейса.</a:t>
+            </a:r>
+          </a:p>
+          <a:p>
+            <a:pPr marL="0" lvl="0" indent="0" algn="l" rtl="0">
+              <a:spcBef>
+                <a:spcPts val="0"/>
+              </a:spcBef>
+              <a:spcAft>
+                <a:spcPts val="0"/>
+              </a:spcAft>
+              <a:buNone/>
+            </a:pPr>
+            <a:endParaRPr dirty="0"/>
           </a:p>
         </p:txBody>
       </p:sp>
@@ -1036,7 +1294,80 @@
               </a:spcAft>
               <a:buNone/>
             </a:pPr>
-            <a:endParaRPr/>
+            <a:r>
+              <a:rPr lang="ru-RU" dirty="0" smtClean="0"/>
+              <a:t>Слайд</a:t>
+            </a:r>
+            <a:r>
+              <a:rPr lang="ru-RU" baseline="0" dirty="0" smtClean="0"/>
+              <a:t> 10. Предлагаемое решение</a:t>
+            </a:r>
+          </a:p>
+          <a:p>
+            <a:pPr marL="0" lvl="0" indent="0" algn="l" rtl="0">
+              <a:spcBef>
+                <a:spcPts val="0"/>
+              </a:spcBef>
+              <a:spcAft>
+                <a:spcPts val="0"/>
+              </a:spcAft>
+              <a:buNone/>
+            </a:pPr>
+            <a:endParaRPr lang="ru-RU" baseline="0" dirty="0" smtClean="0"/>
+          </a:p>
+          <a:p>
+            <a:pPr marL="0" lvl="0" indent="0" algn="l" rtl="0">
+              <a:spcBef>
+                <a:spcPts val="0"/>
+              </a:spcBef>
+              <a:spcAft>
+                <a:spcPts val="0"/>
+              </a:spcAft>
+              <a:buNone/>
+            </a:pPr>
+            <a:r>
+              <a:rPr lang="ru-RU" dirty="0" smtClean="0"/>
+              <a:t>Учитывая все преимущества и недостатки, предлагается разработать WEB-интерфейс для системы, которая должна быть установлена заранее на реализуемом оборудовании. </a:t>
+            </a:r>
+          </a:p>
+          <a:p>
+            <a:pPr marL="0" lvl="0" indent="0" algn="l" rtl="0">
+              <a:spcBef>
+                <a:spcPts val="0"/>
+              </a:spcBef>
+              <a:spcAft>
+                <a:spcPts val="0"/>
+              </a:spcAft>
+              <a:buNone/>
+            </a:pPr>
+            <a:endParaRPr lang="ru-RU" dirty="0" smtClean="0"/>
+          </a:p>
+          <a:p>
+            <a:pPr marL="0" lvl="0" indent="0" algn="l" rtl="0">
+              <a:spcBef>
+                <a:spcPts val="0"/>
+              </a:spcBef>
+              <a:spcAft>
+                <a:spcPts val="0"/>
+              </a:spcAft>
+              <a:buNone/>
+            </a:pPr>
+            <a:r>
+              <a:rPr lang="ru-RU" dirty="0" smtClean="0"/>
+              <a:t>Для активации SLA-мониторинга нет необходимости приобретать дополнительные услуги или оборудования, достаточно будет произвести конфигурацию уже имеющейся сети.</a:t>
+            </a:r>
+          </a:p>
+          <a:p>
+            <a:pPr marL="0" lvl="0" indent="0" algn="l" rtl="0">
+              <a:spcBef>
+                <a:spcPts val="0"/>
+              </a:spcBef>
+              <a:spcAft>
+                <a:spcPts val="0"/>
+              </a:spcAft>
+              <a:buNone/>
+            </a:pPr>
+            <a:endParaRPr dirty="0"/>
           </a:p>
         </p:txBody>
       </p:sp>
@@ -1145,7 +1476,156 @@
               </a:spcAft>
               <a:buNone/>
             </a:pPr>
-            <a:endParaRPr/>
+            <a:r>
+              <a:rPr lang="ru-RU" dirty="0" smtClean="0"/>
+              <a:t>Слайд 13. Требования</a:t>
+            </a:r>
+            <a:r>
+              <a:rPr lang="ru-RU" baseline="0" dirty="0" smtClean="0"/>
+              <a:t> к ПО</a:t>
+            </a:r>
+          </a:p>
+          <a:p>
+            <a:pPr marL="0" lvl="0" indent="0" algn="l" rtl="0">
+              <a:spcBef>
+                <a:spcPts val="0"/>
+              </a:spcBef>
+              <a:spcAft>
+                <a:spcPts val="0"/>
+              </a:spcAft>
+              <a:buNone/>
+            </a:pPr>
+            <a:endParaRPr lang="ru-RU" baseline="0" dirty="0" smtClean="0"/>
+          </a:p>
+          <a:p>
+            <a:pPr marL="0" lvl="0" indent="0" algn="l" rtl="0">
+              <a:spcBef>
+                <a:spcPts val="0"/>
+              </a:spcBef>
+              <a:spcAft>
+                <a:spcPts val="0"/>
+              </a:spcAft>
+              <a:buNone/>
+            </a:pPr>
+            <a:r>
+              <a:rPr lang="ru-RU" dirty="0" smtClean="0"/>
+              <a:t>- Должный уровень </a:t>
+            </a:r>
+            <a:r>
+              <a:rPr lang="ru-RU" dirty="0" err="1" smtClean="0"/>
+              <a:t>usability</a:t>
+            </a:r>
+            <a:r>
+              <a:rPr lang="ru-RU" dirty="0" smtClean="0"/>
+              <a:t>;</a:t>
+            </a:r>
+          </a:p>
+          <a:p>
+            <a:pPr marL="0" lvl="0" indent="0" algn="l" rtl="0">
+              <a:spcBef>
+                <a:spcPts val="0"/>
+              </a:spcBef>
+              <a:spcAft>
+                <a:spcPts val="0"/>
+              </a:spcAft>
+              <a:buNone/>
+            </a:pPr>
+            <a:r>
+              <a:rPr lang="ru-RU" dirty="0" smtClean="0"/>
+              <a:t>- кроссплатформенность (адаптивная вёрстка);</a:t>
+            </a:r>
+          </a:p>
+          <a:p>
+            <a:pPr marL="0" lvl="0" indent="0" algn="l" rtl="0">
+              <a:spcBef>
+                <a:spcPts val="0"/>
+              </a:spcBef>
+              <a:spcAft>
+                <a:spcPts val="0"/>
+              </a:spcAft>
+              <a:buNone/>
+            </a:pPr>
+            <a:r>
+              <a:rPr lang="ru-RU" dirty="0" smtClean="0"/>
+              <a:t>-</a:t>
+            </a:r>
+            <a:r>
+              <a:rPr lang="ru-RU" baseline="0" dirty="0" smtClean="0"/>
+              <a:t> </a:t>
+            </a:r>
+            <a:r>
+              <a:rPr lang="ru-RU" dirty="0" smtClean="0"/>
+              <a:t>интуитивно понятный пользовательский интерфейс;</a:t>
+            </a:r>
+          </a:p>
+          <a:p>
+            <a:pPr marL="0" lvl="0" indent="0" algn="l" rtl="0">
+              <a:spcBef>
+                <a:spcPts val="0"/>
+              </a:spcBef>
+              <a:spcAft>
+                <a:spcPts val="0"/>
+              </a:spcAft>
+              <a:buNone/>
+            </a:pPr>
+            <a:r>
+              <a:rPr lang="ru-RU" dirty="0" smtClean="0"/>
+              <a:t>- высокая степень информативности;</a:t>
+            </a:r>
+          </a:p>
+          <a:p>
+            <a:pPr marL="0" lvl="0" indent="0" algn="l" rtl="0">
+              <a:spcBef>
+                <a:spcPts val="0"/>
+              </a:spcBef>
+              <a:spcAft>
+                <a:spcPts val="0"/>
+              </a:spcAft>
+              <a:buNone/>
+            </a:pPr>
+            <a:r>
+              <a:rPr lang="ru-RU" dirty="0" smtClean="0"/>
+              <a:t>- использование современного стека WEB-разработчика.</a:t>
+            </a:r>
+          </a:p>
+          <a:p>
+            <a:pPr marL="0" lvl="0" indent="0" algn="l" rtl="0">
+              <a:spcBef>
+                <a:spcPts val="0"/>
+              </a:spcBef>
+              <a:spcAft>
+                <a:spcPts val="0"/>
+              </a:spcAft>
+              <a:buNone/>
+            </a:pPr>
+            <a:endParaRPr lang="ru-RU" dirty="0" smtClean="0"/>
+          </a:p>
+          <a:p>
+            <a:pPr marL="0" lvl="0" indent="0" algn="l" rtl="0">
+              <a:spcBef>
+                <a:spcPts val="0"/>
+              </a:spcBef>
+              <a:spcAft>
+                <a:spcPts val="0"/>
+              </a:spcAft>
+              <a:buNone/>
+            </a:pPr>
+            <a:r>
+              <a:rPr lang="ru-RU" dirty="0" smtClean="0"/>
+              <a:t>Результативное ПО должно формировать и отправлять поисковый запрос на тестовый сервер, получать результаты поиска и выдавать оператору ПО в удобном виде.</a:t>
+            </a:r>
+          </a:p>
+          <a:p>
+            <a:pPr marL="0" lvl="0" indent="0" algn="l" rtl="0">
+              <a:spcBef>
+                <a:spcPts val="0"/>
+              </a:spcBef>
+              <a:spcAft>
+                <a:spcPts val="0"/>
+              </a:spcAft>
+              <a:buNone/>
+            </a:pPr>
+            <a:endParaRPr dirty="0"/>
           </a:p>
         </p:txBody>
       </p:sp>
@@ -1163,6 +1643,210 @@
 </file>
 
 <file path=ppt/notesSlides/notesSlide13.xml><?xml version="1.0" encoding="utf-8"?>
+<p:notes xmlns:a="http://schemas.openxmlformats.org/drawingml/2006/main" xmlns:r="http://schemas.openxmlformats.org/officeDocument/2006/relationships" xmlns:p="http://schemas.openxmlformats.org/presentationml/2006/main">
+  <p:cSld>
+    <p:spTree>
+      <p:nvGrpSpPr>
+        <p:cNvPr id="1" name=""/>
+        <p:cNvGrpSpPr/>
+        <p:nvPr/>
+      </p:nvGrpSpPr>
+      <p:grpSpPr>
+        <a:xfrm>
+          <a:off x="0" y="0"/>
+          <a:ext cx="0" cy="0"/>
+          <a:chOff x="0" y="0"/>
+          <a:chExt cx="0" cy="0"/>
+        </a:xfrm>
+      </p:grpSpPr>
+      <p:sp>
+        <p:nvSpPr>
+          <p:cNvPr id="2" name="Slide Image Placeholder 1"/>
+          <p:cNvSpPr>
+            <a:spLocks noGrp="1" noRot="1" noChangeAspect="1"/>
+          </p:cNvSpPr>
+          <p:nvPr>
+            <p:ph type="sldImg"/>
+          </p:nvPr>
+        </p:nvSpPr>
+        <p:spPr/>
+      </p:sp>
+      <p:sp>
+        <p:nvSpPr>
+          <p:cNvPr id="3" name="Notes Placeholder 2"/>
+          <p:cNvSpPr>
+            <a:spLocks noGrp="1"/>
+          </p:cNvSpPr>
+          <p:nvPr>
+            <p:ph type="body" idx="1"/>
+          </p:nvPr>
+        </p:nvSpPr>
+        <p:spPr/>
+        <p:txBody>
+          <a:bodyPr/>
+          <a:lstStyle/>
+          <a:p>
+            <a:pPr marL="158750" indent="0">
+              <a:buNone/>
+            </a:pPr>
+            <a:r>
+              <a:rPr lang="ru-RU" dirty="0" smtClean="0"/>
+              <a:t>Слайд</a:t>
+            </a:r>
+            <a:r>
+              <a:rPr lang="ru-RU" baseline="0" dirty="0" smtClean="0"/>
+              <a:t> 14. Дерево форм. </a:t>
+            </a:r>
+          </a:p>
+          <a:p>
+            <a:pPr marL="158750" indent="0">
+              <a:buNone/>
+            </a:pPr>
+            <a:endParaRPr lang="ru-RU" baseline="0" dirty="0" smtClean="0"/>
+          </a:p>
+          <a:p>
+            <a:pPr marL="158750" indent="0">
+              <a:buNone/>
+            </a:pPr>
+            <a:r>
+              <a:rPr lang="ru-RU" baseline="0" dirty="0" smtClean="0"/>
+              <a:t>Планируется размещение нескольких форм на одной странице с помощью сворачиваемых панелей расширения.</a:t>
+            </a:r>
+            <a:endParaRPr lang="en-US" dirty="0"/>
+          </a:p>
+        </p:txBody>
+      </p:sp>
+    </p:spTree>
+    <p:extLst>
+      <p:ext uri="{BB962C8B-B14F-4D97-AF65-F5344CB8AC3E}">
+        <p14:creationId xmlns:p14="http://schemas.microsoft.com/office/powerpoint/2010/main" val="3486678079"/>
+      </p:ext>
+    </p:extLst>
+  </p:cSld>
+  <p:clrMapOvr>
+    <a:masterClrMapping/>
+  </p:clrMapOvr>
+</p:notes>
+</file>
+
+<file path=ppt/notesSlides/notesSlide14.xml><?xml version="1.0" encoding="utf-8"?>
+<p:notes xmlns:a="http://schemas.openxmlformats.org/drawingml/2006/main" xmlns:r="http://schemas.openxmlformats.org/officeDocument/2006/relationships" xmlns:p="http://schemas.openxmlformats.org/presentationml/2006/main">
+  <p:cSld>
+    <p:spTree>
+      <p:nvGrpSpPr>
+        <p:cNvPr id="1" name=""/>
+        <p:cNvGrpSpPr/>
+        <p:nvPr/>
+      </p:nvGrpSpPr>
+      <p:grpSpPr>
+        <a:xfrm>
+          <a:off x="0" y="0"/>
+          <a:ext cx="0" cy="0"/>
+          <a:chOff x="0" y="0"/>
+          <a:chExt cx="0" cy="0"/>
+        </a:xfrm>
+      </p:grpSpPr>
+      <p:sp>
+        <p:nvSpPr>
+          <p:cNvPr id="2" name="Slide Image Placeholder 1"/>
+          <p:cNvSpPr>
+            <a:spLocks noGrp="1" noRot="1" noChangeAspect="1"/>
+          </p:cNvSpPr>
+          <p:nvPr>
+            <p:ph type="sldImg"/>
+          </p:nvPr>
+        </p:nvSpPr>
+        <p:spPr/>
+      </p:sp>
+      <p:sp>
+        <p:nvSpPr>
+          <p:cNvPr id="3" name="Notes Placeholder 2"/>
+          <p:cNvSpPr>
+            <a:spLocks noGrp="1"/>
+          </p:cNvSpPr>
+          <p:nvPr>
+            <p:ph type="body" idx="1"/>
+          </p:nvPr>
+        </p:nvSpPr>
+        <p:spPr/>
+        <p:txBody>
+          <a:bodyPr/>
+          <a:lstStyle/>
+          <a:p>
+            <a:pPr marL="158750" indent="0">
+              <a:buNone/>
+            </a:pPr>
+            <a:r>
+              <a:rPr lang="ru-RU" dirty="0" smtClean="0"/>
+              <a:t>Слайд 15. Прототип</a:t>
+            </a:r>
+            <a:r>
+              <a:rPr lang="ru-RU" baseline="0" dirty="0" smtClean="0"/>
+              <a:t> интерфейса. </a:t>
+            </a:r>
+          </a:p>
+          <a:p>
+            <a:pPr marL="158750" indent="0">
+              <a:buNone/>
+            </a:pPr>
+            <a:endParaRPr lang="ru-RU" baseline="0" dirty="0" smtClean="0"/>
+          </a:p>
+          <a:p>
+            <a:pPr marL="158750" indent="0">
+              <a:buNone/>
+            </a:pPr>
+            <a:r>
+              <a:rPr lang="ru-RU" baseline="0" dirty="0" smtClean="0"/>
+              <a:t>Страница авторизации (слева снизу).</a:t>
+            </a:r>
+          </a:p>
+          <a:p>
+            <a:pPr marL="158750" indent="0">
+              <a:buNone/>
+            </a:pPr>
+            <a:endParaRPr lang="ru-RU" baseline="0" dirty="0" smtClean="0"/>
+          </a:p>
+          <a:p>
+            <a:pPr marL="158750" indent="0">
+              <a:buNone/>
+            </a:pPr>
+            <a:r>
+              <a:rPr lang="ru-RU" baseline="0" dirty="0" smtClean="0"/>
+              <a:t>Страница поиска (справа сверху).</a:t>
+            </a:r>
+          </a:p>
+          <a:p>
+            <a:pPr marL="158750" indent="0">
+              <a:buNone/>
+            </a:pPr>
+            <a:endParaRPr lang="ru-RU" baseline="0" dirty="0" smtClean="0"/>
+          </a:p>
+          <a:p>
+            <a:pPr marL="158750" indent="0">
+              <a:buNone/>
+            </a:pPr>
+            <a:r>
+              <a:rPr lang="ru-RU" baseline="0" dirty="0" smtClean="0"/>
+              <a:t>Таблица с результатами поиска (справа снизу).</a:t>
+            </a:r>
+            <a:endParaRPr lang="en-US" dirty="0"/>
+          </a:p>
+        </p:txBody>
+      </p:sp>
+    </p:spTree>
+    <p:extLst>
+      <p:ext uri="{BB962C8B-B14F-4D97-AF65-F5344CB8AC3E}">
+        <p14:creationId xmlns:p14="http://schemas.microsoft.com/office/powerpoint/2010/main" val="2052402784"/>
+      </p:ext>
+    </p:extLst>
+  </p:cSld>
+  <p:clrMapOvr>
+    <a:masterClrMapping/>
+  </p:clrMapOvr>
+</p:notes>
+</file>
+
+<file path=ppt/notesSlides/notesSlide15.xml><?xml version="1.0" encoding="utf-8"?>
 <p:notes xmlns:a="http://schemas.openxmlformats.org/drawingml/2006/main" xmlns:r="http://schemas.openxmlformats.org/officeDocument/2006/relationships" xmlns:p="http://schemas.openxmlformats.org/presentationml/2006/main" showMasterSp="0" showMasterPhAnim="0">
   <p:cSld>
     <p:spTree>
@@ -1245,6 +1929,35 @@
           </a:bodyPr>
           <a:lstStyle/>
           <a:p>
+            <a:pPr marL="0" marR="0" lvl="0" indent="0" algn="l" defTabSz="914400" rtl="0" eaLnBrk="1" fontAlgn="auto" latinLnBrk="0" hangingPunct="1">
+              <a:lnSpc>
+                <a:spcPct val="100000"/>
+              </a:lnSpc>
+              <a:spcBef>
+                <a:spcPts val="0"/>
+              </a:spcBef>
+              <a:spcAft>
+                <a:spcPts val="0"/>
+              </a:spcAft>
+              <a:buClr>
+                <a:srgbClr val="000000"/>
+              </a:buClr>
+              <a:buSzPts val="1100"/>
+              <a:buFont typeface="Arial"/>
+              <a:buNone/>
+              <a:tabLst/>
+              <a:defRPr/>
+            </a:pPr>
+            <a:r>
+              <a:rPr lang="ru-RU" dirty="0" smtClean="0"/>
+              <a:t>Слайд 16. Пример отображения интерфейса на экране</a:t>
+            </a:r>
+            <a:r>
+              <a:rPr lang="ru-RU" baseline="0" dirty="0" smtClean="0"/>
+              <a:t> ПК с высоким разрешением</a:t>
+            </a:r>
+          </a:p>
+          <a:p>
             <a:pPr marL="0" lvl="0" indent="0" algn="l" rtl="0">
               <a:spcBef>
                 <a:spcPts val="0"/>
@@ -1254,7 +1967,7 @@
               </a:spcAft>
               <a:buNone/>
             </a:pPr>
-            <a:endParaRPr/>
+            <a:endParaRPr dirty="0"/>
           </a:p>
         </p:txBody>
       </p:sp>
@@ -1266,7 +1979,7 @@
 </p:notes>
 </file>
 
-<file path=ppt/notesSlides/notesSlide14.xml><?xml version="1.0" encoding="utf-8"?>
+<file path=ppt/notesSlides/notesSlide16.xml><?xml version="1.0" encoding="utf-8"?>
 <p:notes xmlns:a="http://schemas.openxmlformats.org/drawingml/2006/main" xmlns:r="http://schemas.openxmlformats.org/officeDocument/2006/relationships" xmlns:p="http://schemas.openxmlformats.org/presentationml/2006/main" showMasterSp="0" showMasterPhAnim="0">
   <p:cSld>
     <p:spTree>
@@ -1358,7 +2071,15 @@
               </a:spcAft>
               <a:buNone/>
             </a:pPr>
-            <a:endParaRPr/>
+            <a:r>
+              <a:rPr lang="ru-RU" dirty="0" smtClean="0"/>
+              <a:t>Слайд 17. Демонстрация работы адаптивной вёрстки на примере экрана</a:t>
+            </a:r>
+            <a:r>
+              <a:rPr lang="ru-RU" baseline="0" dirty="0" smtClean="0"/>
+              <a:t> смартфона.</a:t>
+            </a:r>
+            <a:endParaRPr dirty="0"/>
           </a:p>
         </p:txBody>
       </p:sp>
@@ -1370,7 +2091,7 @@
 </p:notes>
 </file>
 
-<file path=ppt/notesSlides/notesSlide15.xml><?xml version="1.0" encoding="utf-8"?>
+<file path=ppt/notesSlides/notesSlide17.xml><?xml version="1.0" encoding="utf-8"?>
 <p:notes xmlns:a="http://schemas.openxmlformats.org/drawingml/2006/main" xmlns:r="http://schemas.openxmlformats.org/officeDocument/2006/relationships" xmlns:p="http://schemas.openxmlformats.org/presentationml/2006/main" showMasterSp="0" showMasterPhAnim="0">
   <p:cSld>
     <p:spTree>
@@ -1462,229 +2183,19 @@
               </a:spcAft>
               <a:buNone/>
             </a:pPr>
-            <a:endParaRPr/>
+            <a:r>
+              <a:rPr lang="ru-RU" dirty="0" smtClean="0"/>
+              <a:t>Слайд 18. Отображение страниц на экране</a:t>
+            </a:r>
+            <a:r>
+              <a:rPr lang="ru-RU" baseline="0" dirty="0" smtClean="0"/>
+              <a:t> планшетных ПК</a:t>
+            </a:r>
+            <a:endParaRPr dirty="0"/>
           </a:p>
         </p:txBody>
       </p:sp>
     </p:spTree>
-  </p:cSld>
-  <p:clrMapOvr>
-    <a:masterClrMapping/>
-  </p:clrMapOvr>
-</p:notes>
-</file>
-
-<file path=ppt/notesSlides/notesSlide16.xml><?xml version="1.0" encoding="utf-8"?>
-<p:notes xmlns:a="http://schemas.openxmlformats.org/drawingml/2006/main" xmlns:r="http://schemas.openxmlformats.org/officeDocument/2006/relationships" xmlns:p="http://schemas.openxmlformats.org/presentationml/2006/main" showMasterSp="0" showMasterPhAnim="0">
-  <p:cSld>
-    <p:spTree>
-      <p:nvGrpSpPr>
-        <p:cNvPr id="1" name="Shape 235"/>
-        <p:cNvGrpSpPr/>
-        <p:nvPr/>
-      </p:nvGrpSpPr>
-      <p:grpSpPr>
-        <a:xfrm>
-          <a:off x="0" y="0"/>
-          <a:ext cx="0" cy="0"/>
-          <a:chOff x="0" y="0"/>
-          <a:chExt cx="0" cy="0"/>
-        </a:xfrm>
-      </p:grpSpPr>
-      <p:sp>
-        <p:nvSpPr>
-          <p:cNvPr id="236" name="Google Shape;236;g442eb61d9d_0_43:notes"/>
-          <p:cNvSpPr>
-            <a:spLocks noGrp="1" noRot="1" noChangeAspect="1"/>
-          </p:cNvSpPr>
-          <p:nvPr>
-            <p:ph type="sldImg" idx="2"/>
-          </p:nvPr>
-        </p:nvSpPr>
-        <p:spPr>
-          <a:xfrm>
-            <a:off x="381000" y="685800"/>
-            <a:ext cx="6096000" cy="3429000"/>
-          </a:xfrm>
-          <a:custGeom>
-            <a:avLst/>
-            <a:gdLst/>
-            <a:ahLst/>
-            <a:cxnLst/>
-            <a:rect l="l" t="t" r="r" b="b"/>
-            <a:pathLst>
-              <a:path w="120000" h="120000" extrusionOk="0">
-                <a:moveTo>
-                  <a:pt x="0" y="0"/>
-                </a:moveTo>
-                <a:lnTo>
-                  <a:pt x="120000" y="0"/>
-                </a:lnTo>
-                <a:lnTo>
-                  <a:pt x="120000" y="120000"/>
-                </a:lnTo>
-                <a:lnTo>
-                  <a:pt x="0" y="120000"/>
-                </a:lnTo>
-                <a:close/>
-              </a:path>
-            </a:pathLst>
-          </a:custGeom>
-        </p:spPr>
-      </p:sp>
-      <p:sp>
-        <p:nvSpPr>
-          <p:cNvPr id="237" name="Google Shape;237;g442eb61d9d_0_43:notes"/>
-          <p:cNvSpPr txBox="1">
-            <a:spLocks noGrp="1"/>
-          </p:cNvSpPr>
-          <p:nvPr>
-            <p:ph type="body" idx="1"/>
-          </p:nvPr>
-        </p:nvSpPr>
-        <p:spPr>
-          <a:xfrm>
-            <a:off x="685800" y="4343400"/>
-            <a:ext cx="5486400" cy="4114800"/>
-          </a:xfrm>
-          <a:prstGeom prst="rect">
-            <a:avLst/>
-          </a:prstGeom>
-        </p:spPr>
-        <p:txBody>
-          <a:bodyPr spcFirstLastPara="1" wrap="square" lIns="91425" tIns="91425" rIns="91425" bIns="91425" anchor="t" anchorCtr="0">
-            <a:noAutofit/>
-          </a:bodyPr>
-          <a:lstStyle/>
-          <a:p>
-            <a:pPr marL="0" lvl="0" indent="0" algn="l" rtl="0">
-              <a:spcBef>
-                <a:spcPts val="0"/>
-              </a:spcBef>
-              <a:spcAft>
-                <a:spcPts val="0"/>
-              </a:spcAft>
-              <a:buNone/>
-            </a:pPr>
-            <a:endParaRPr/>
-          </a:p>
-        </p:txBody>
-      </p:sp>
-    </p:spTree>
-    <p:extLst>
-      <p:ext uri="{BB962C8B-B14F-4D97-AF65-F5344CB8AC3E}">
-        <p14:creationId xmlns:p14="http://schemas.microsoft.com/office/powerpoint/2010/main" val="3390537957"/>
-      </p:ext>
-    </p:extLst>
-  </p:cSld>
-  <p:clrMapOvr>
-    <a:masterClrMapping/>
-  </p:clrMapOvr>
-</p:notes>
-</file>
-
-<file path=ppt/notesSlides/notesSlide17.xml><?xml version="1.0" encoding="utf-8"?>
-<p:notes xmlns:a="http://schemas.openxmlformats.org/drawingml/2006/main" xmlns:r="http://schemas.openxmlformats.org/officeDocument/2006/relationships" xmlns:p="http://schemas.openxmlformats.org/presentationml/2006/main" showMasterSp="0" showMasterPhAnim="0">
-  <p:cSld>
-    <p:spTree>
-      <p:nvGrpSpPr>
-        <p:cNvPr id="1" name="Shape 235"/>
-        <p:cNvGrpSpPr/>
-        <p:nvPr/>
-      </p:nvGrpSpPr>
-      <p:grpSpPr>
-        <a:xfrm>
-          <a:off x="0" y="0"/>
-          <a:ext cx="0" cy="0"/>
-          <a:chOff x="0" y="0"/>
-          <a:chExt cx="0" cy="0"/>
-        </a:xfrm>
-      </p:grpSpPr>
-      <p:sp>
-        <p:nvSpPr>
-          <p:cNvPr id="236" name="Google Shape;236;g442eb61d9d_0_43:notes"/>
-          <p:cNvSpPr>
-            <a:spLocks noGrp="1" noRot="1" noChangeAspect="1"/>
-          </p:cNvSpPr>
-          <p:nvPr>
-            <p:ph type="sldImg" idx="2"/>
-          </p:nvPr>
-        </p:nvSpPr>
-        <p:spPr>
-          <a:xfrm>
-            <a:off x="381000" y="685800"/>
-            <a:ext cx="6096000" cy="3429000"/>
-          </a:xfrm>
-          <a:custGeom>
-            <a:avLst/>
-            <a:gdLst/>
-            <a:ahLst/>
-            <a:cxnLst/>
-            <a:rect l="l" t="t" r="r" b="b"/>
-            <a:pathLst>
-              <a:path w="120000" h="120000" extrusionOk="0">
-                <a:moveTo>
-                  <a:pt x="0" y="0"/>
-                </a:moveTo>
-                <a:lnTo>
-                  <a:pt x="120000" y="0"/>
-                </a:lnTo>
-                <a:lnTo>
-                  <a:pt x="120000" y="120000"/>
-                </a:lnTo>
-                <a:lnTo>
-                  <a:pt x="0" y="120000"/>
-                </a:lnTo>
-                <a:close/>
-              </a:path>
-            </a:pathLst>
-          </a:custGeom>
-        </p:spPr>
-      </p:sp>
-      <p:sp>
-        <p:nvSpPr>
-          <p:cNvPr id="237" name="Google Shape;237;g442eb61d9d_0_43:notes"/>
-          <p:cNvSpPr txBox="1">
-            <a:spLocks noGrp="1"/>
-          </p:cNvSpPr>
-          <p:nvPr>
-            <p:ph type="body" idx="1"/>
-          </p:nvPr>
-        </p:nvSpPr>
-        <p:spPr>
-          <a:xfrm>
-            <a:off x="685800" y="4343400"/>
-            <a:ext cx="5486400" cy="4114800"/>
-          </a:xfrm>
-          <a:prstGeom prst="rect">
-            <a:avLst/>
-          </a:prstGeom>
-        </p:spPr>
-        <p:txBody>
-          <a:bodyPr spcFirstLastPara="1" wrap="square" lIns="91425" tIns="91425" rIns="91425" bIns="91425" anchor="t" anchorCtr="0">
-            <a:noAutofit/>
-          </a:bodyPr>
-          <a:lstStyle/>
-          <a:p>
-            <a:pPr marL="0" lvl="0" indent="0" algn="l" rtl="0">
-              <a:spcBef>
-                <a:spcPts val="0"/>
-              </a:spcBef>
-              <a:spcAft>
-                <a:spcPts val="0"/>
-              </a:spcAft>
-              <a:buNone/>
-            </a:pPr>
-            <a:endParaRPr/>
-          </a:p>
-        </p:txBody>
-      </p:sp>
-    </p:spTree>
-    <p:extLst>
-      <p:ext uri="{BB962C8B-B14F-4D97-AF65-F5344CB8AC3E}">
-        <p14:creationId xmlns:p14="http://schemas.microsoft.com/office/powerpoint/2010/main" val="3351117671"/>
-      </p:ext>
-    </p:extLst>
   </p:cSld>
   <p:clrMapOvr>
     <a:masterClrMapping/>
@@ -1784,14 +2295,177 @@
               </a:spcAft>
               <a:buNone/>
             </a:pPr>
-            <a:endParaRPr/>
+            <a:r>
+              <a:rPr lang="ru-RU" dirty="0" smtClean="0"/>
+              <a:t>Слайд 19. И</a:t>
+            </a:r>
+            <a:r>
+              <a:rPr lang="ru-RU" baseline="0" dirty="0" smtClean="0"/>
+              <a:t>нтерфейс для ПК, страница поиска. </a:t>
+            </a:r>
+            <a:r>
+              <a:rPr lang="ru-RU" dirty="0" smtClean="0"/>
+              <a:t>Крупный план</a:t>
+            </a:r>
+            <a:r>
+              <a:rPr lang="ru-RU" baseline="0" dirty="0" smtClean="0"/>
+              <a:t>.</a:t>
+            </a:r>
+            <a:endParaRPr dirty="0"/>
           </a:p>
         </p:txBody>
       </p:sp>
     </p:spTree>
     <p:extLst>
       <p:ext uri="{BB962C8B-B14F-4D97-AF65-F5344CB8AC3E}">
-        <p14:creationId xmlns:p14="http://schemas.microsoft.com/office/powerpoint/2010/main" val="1748076789"/>
+        <p14:creationId xmlns:p14="http://schemas.microsoft.com/office/powerpoint/2010/main" val="3390537957"/>
+      </p:ext>
+    </p:extLst>
+  </p:cSld>
+  <p:clrMapOvr>
+    <a:masterClrMapping/>
+  </p:clrMapOvr>
+</p:notes>
+</file>
+
+<file path=ppt/notesSlides/notesSlide19.xml><?xml version="1.0" encoding="utf-8"?>
+<p:notes xmlns:a="http://schemas.openxmlformats.org/drawingml/2006/main" xmlns:r="http://schemas.openxmlformats.org/officeDocument/2006/relationships" xmlns:p="http://schemas.openxmlformats.org/presentationml/2006/main" showMasterSp="0" showMasterPhAnim="0">
+  <p:cSld>
+    <p:spTree>
+      <p:nvGrpSpPr>
+        <p:cNvPr id="1" name="Shape 235"/>
+        <p:cNvGrpSpPr/>
+        <p:nvPr/>
+      </p:nvGrpSpPr>
+      <p:grpSpPr>
+        <a:xfrm>
+          <a:off x="0" y="0"/>
+          <a:ext cx="0" cy="0"/>
+          <a:chOff x="0" y="0"/>
+          <a:chExt cx="0" cy="0"/>
+        </a:xfrm>
+      </p:grpSpPr>
+      <p:sp>
+        <p:nvSpPr>
+          <p:cNvPr id="236" name="Google Shape;236;g442eb61d9d_0_43:notes"/>
+          <p:cNvSpPr>
+            <a:spLocks noGrp="1" noRot="1" noChangeAspect="1"/>
+          </p:cNvSpPr>
+          <p:nvPr>
+            <p:ph type="sldImg" idx="2"/>
+          </p:nvPr>
+        </p:nvSpPr>
+        <p:spPr>
+          <a:xfrm>
+            <a:off x="381000" y="685800"/>
+            <a:ext cx="6096000" cy="3429000"/>
+          </a:xfrm>
+          <a:custGeom>
+            <a:avLst/>
+            <a:gdLst/>
+            <a:ahLst/>
+            <a:cxnLst/>
+            <a:rect l="l" t="t" r="r" b="b"/>
+            <a:pathLst>
+              <a:path w="120000" h="120000" extrusionOk="0">
+                <a:moveTo>
+                  <a:pt x="0" y="0"/>
+                </a:moveTo>
+                <a:lnTo>
+                  <a:pt x="120000" y="0"/>
+                </a:lnTo>
+                <a:lnTo>
+                  <a:pt x="120000" y="120000"/>
+                </a:lnTo>
+                <a:lnTo>
+                  <a:pt x="0" y="120000"/>
+                </a:lnTo>
+                <a:close/>
+              </a:path>
+            </a:pathLst>
+          </a:custGeom>
+        </p:spPr>
+      </p:sp>
+      <p:sp>
+        <p:nvSpPr>
+          <p:cNvPr id="237" name="Google Shape;237;g442eb61d9d_0_43:notes"/>
+          <p:cNvSpPr txBox="1">
+            <a:spLocks noGrp="1"/>
+          </p:cNvSpPr>
+          <p:nvPr>
+            <p:ph type="body" idx="1"/>
+          </p:nvPr>
+        </p:nvSpPr>
+        <p:spPr>
+          <a:xfrm>
+            <a:off x="685800" y="4343400"/>
+            <a:ext cx="5486400" cy="4114800"/>
+          </a:xfrm>
+          <a:prstGeom prst="rect">
+            <a:avLst/>
+          </a:prstGeom>
+        </p:spPr>
+        <p:txBody>
+          <a:bodyPr spcFirstLastPara="1" wrap="square" lIns="91425" tIns="91425" rIns="91425" bIns="91425" anchor="t" anchorCtr="0">
+            <a:noAutofit/>
+          </a:bodyPr>
+          <a:lstStyle/>
+          <a:p>
+            <a:pPr marL="0" marR="0" lvl="0" indent="0" algn="l" defTabSz="914400" rtl="0" eaLnBrk="1" fontAlgn="auto" latinLnBrk="0" hangingPunct="1">
+              <a:lnSpc>
+                <a:spcPct val="100000"/>
+              </a:lnSpc>
+              <a:spcBef>
+                <a:spcPts val="0"/>
+              </a:spcBef>
+              <a:spcAft>
+                <a:spcPts val="0"/>
+              </a:spcAft>
+              <a:buClr>
+                <a:srgbClr val="000000"/>
+              </a:buClr>
+              <a:buSzPts val="1100"/>
+              <a:buFont typeface="Arial"/>
+              <a:buNone/>
+              <a:tabLst/>
+              <a:defRPr/>
+            </a:pPr>
+            <a:r>
+              <a:rPr lang="ru-RU" dirty="0" smtClean="0"/>
+              <a:t>Слайд 20. И</a:t>
+            </a:r>
+            <a:r>
+              <a:rPr lang="ru-RU" baseline="0" dirty="0" smtClean="0"/>
+              <a:t>нтерфейс для ПК, таблица с результатами. </a:t>
+            </a:r>
+            <a:r>
+              <a:rPr lang="ru-RU" dirty="0" smtClean="0"/>
+              <a:t>Крупный план</a:t>
+            </a:r>
+            <a:r>
+              <a:rPr lang="ru-RU" baseline="0" dirty="0" smtClean="0"/>
+              <a:t>.</a:t>
+            </a:r>
+            <a:endParaRPr lang="ru-RU" dirty="0" smtClean="0"/>
+          </a:p>
+          <a:p>
+            <a:pPr marL="0" lvl="0" indent="0" algn="l" rtl="0">
+              <a:spcBef>
+                <a:spcPts val="0"/>
+              </a:spcBef>
+              <a:spcAft>
+                <a:spcPts val="0"/>
+              </a:spcAft>
+              <a:buNone/>
+            </a:pPr>
+            <a:endParaRPr dirty="0"/>
+          </a:p>
+        </p:txBody>
+      </p:sp>
+    </p:spTree>
+    <p:extLst>
+      <p:ext uri="{BB962C8B-B14F-4D97-AF65-F5344CB8AC3E}">
+        <p14:creationId xmlns:p14="http://schemas.microsoft.com/office/powerpoint/2010/main" val="3351117671"/>
       </p:ext>
     </p:extLst>
   </p:cSld>
@@ -1893,7 +2567,100 @@
               </a:spcAft>
               <a:buNone/>
             </a:pPr>
-            <a:endParaRPr/>
+            <a:r>
+              <a:rPr lang="ru-RU" dirty="0" smtClean="0"/>
+              <a:t>Слайд 3. Дистанционный мониторинг</a:t>
+            </a:r>
+          </a:p>
+          <a:p>
+            <a:pPr marL="0" lvl="0" indent="0" algn="l" rtl="0">
+              <a:spcBef>
+                <a:spcPts val="0"/>
+              </a:spcBef>
+              <a:spcAft>
+                <a:spcPts val="0"/>
+              </a:spcAft>
+              <a:buNone/>
+            </a:pPr>
+            <a:endParaRPr lang="ru-RU" dirty="0" smtClean="0"/>
+          </a:p>
+          <a:p>
+            <a:pPr marL="0" lvl="0" indent="0" algn="l" rtl="0">
+              <a:spcBef>
+                <a:spcPts val="0"/>
+              </a:spcBef>
+              <a:spcAft>
+                <a:spcPts val="0"/>
+              </a:spcAft>
+              <a:buNone/>
+            </a:pPr>
+            <a:r>
+              <a:rPr lang="ru-RU" dirty="0" smtClean="0"/>
+              <a:t>Самое удобное решение для компаний – производить контроль своего сетевого оборудования удалённо, чтобы минимизировать потери времени и затраты на выезд обслуживающего персонала.</a:t>
+            </a:r>
+          </a:p>
+          <a:p>
+            <a:pPr marL="0" lvl="0" indent="0" algn="l" rtl="0">
+              <a:spcBef>
+                <a:spcPts val="0"/>
+              </a:spcBef>
+              <a:spcAft>
+                <a:spcPts val="0"/>
+              </a:spcAft>
+              <a:buNone/>
+            </a:pPr>
+            <a:endParaRPr lang="ru-RU" dirty="0" smtClean="0"/>
+          </a:p>
+          <a:p>
+            <a:pPr marL="0" lvl="0" indent="0" algn="l" rtl="0">
+              <a:spcBef>
+                <a:spcPts val="0"/>
+              </a:spcBef>
+              <a:spcAft>
+                <a:spcPts val="0"/>
+              </a:spcAft>
+              <a:buNone/>
+            </a:pPr>
+            <a:r>
+              <a:rPr lang="ru-RU" dirty="0" smtClean="0"/>
+              <a:t>Главное преимущество дистанционного мониторинга (при условии принятия </a:t>
+            </a:r>
+            <a:r>
+              <a:rPr lang="ru-RU" dirty="0" err="1" smtClean="0"/>
+              <a:t>Service</a:t>
+            </a:r>
+            <a:r>
+              <a:rPr lang="ru-RU" dirty="0" smtClean="0"/>
+              <a:t> </a:t>
+            </a:r>
+            <a:r>
+              <a:rPr lang="ru-RU" dirty="0" err="1" smtClean="0"/>
+              <a:t>Level</a:t>
+            </a:r>
+            <a:r>
+              <a:rPr lang="ru-RU" dirty="0" smtClean="0"/>
+              <a:t> </a:t>
+            </a:r>
+            <a:r>
+              <a:rPr lang="ru-RU" dirty="0" err="1" smtClean="0"/>
+              <a:t>Agreement</a:t>
+            </a:r>
+            <a:r>
+              <a:rPr lang="ru-RU" dirty="0" smtClean="0"/>
+              <a:t>, соглашения об уровне обслуживания) – возможность обнаружить и устранить проблему на устройстве пользователя ещё до её обнаружения самим пользователем.</a:t>
+            </a:r>
+          </a:p>
+          <a:p>
+            <a:pPr marL="0" lvl="0" indent="0" algn="l" rtl="0">
+              <a:spcBef>
+                <a:spcPts val="0"/>
+              </a:spcBef>
+              <a:spcAft>
+                <a:spcPts val="0"/>
+              </a:spcAft>
+              <a:buNone/>
+            </a:pPr>
+            <a:endParaRPr dirty="0"/>
           </a:p>
         </p:txBody>
       </p:sp>
@@ -1901,6 +2668,237 @@
     <p:extLst>
       <p:ext uri="{BB962C8B-B14F-4D97-AF65-F5344CB8AC3E}">
         <p14:creationId xmlns:p14="http://schemas.microsoft.com/office/powerpoint/2010/main" val="1983671734"/>
+      </p:ext>
+    </p:extLst>
+  </p:cSld>
+  <p:clrMapOvr>
+    <a:masterClrMapping/>
+  </p:clrMapOvr>
+</p:notes>
+</file>
+
+<file path=ppt/notesSlides/notesSlide20.xml><?xml version="1.0" encoding="utf-8"?>
+<p:notes xmlns:a="http://schemas.openxmlformats.org/drawingml/2006/main" xmlns:r="http://schemas.openxmlformats.org/officeDocument/2006/relationships" xmlns:p="http://schemas.openxmlformats.org/presentationml/2006/main" showMasterSp="0" showMasterPhAnim="0">
+  <p:cSld>
+    <p:spTree>
+      <p:nvGrpSpPr>
+        <p:cNvPr id="1" name="Shape 235"/>
+        <p:cNvGrpSpPr/>
+        <p:nvPr/>
+      </p:nvGrpSpPr>
+      <p:grpSpPr>
+        <a:xfrm>
+          <a:off x="0" y="0"/>
+          <a:ext cx="0" cy="0"/>
+          <a:chOff x="0" y="0"/>
+          <a:chExt cx="0" cy="0"/>
+        </a:xfrm>
+      </p:grpSpPr>
+      <p:sp>
+        <p:nvSpPr>
+          <p:cNvPr id="236" name="Google Shape;236;g442eb61d9d_0_43:notes"/>
+          <p:cNvSpPr>
+            <a:spLocks noGrp="1" noRot="1" noChangeAspect="1"/>
+          </p:cNvSpPr>
+          <p:nvPr>
+            <p:ph type="sldImg" idx="2"/>
+          </p:nvPr>
+        </p:nvSpPr>
+        <p:spPr>
+          <a:xfrm>
+            <a:off x="381000" y="685800"/>
+            <a:ext cx="6096000" cy="3429000"/>
+          </a:xfrm>
+          <a:custGeom>
+            <a:avLst/>
+            <a:gdLst/>
+            <a:ahLst/>
+            <a:cxnLst/>
+            <a:rect l="l" t="t" r="r" b="b"/>
+            <a:pathLst>
+              <a:path w="120000" h="120000" extrusionOk="0">
+                <a:moveTo>
+                  <a:pt x="0" y="0"/>
+                </a:moveTo>
+                <a:lnTo>
+                  <a:pt x="120000" y="0"/>
+                </a:lnTo>
+                <a:lnTo>
+                  <a:pt x="120000" y="120000"/>
+                </a:lnTo>
+                <a:lnTo>
+                  <a:pt x="0" y="120000"/>
+                </a:lnTo>
+                <a:close/>
+              </a:path>
+            </a:pathLst>
+          </a:custGeom>
+        </p:spPr>
+      </p:sp>
+      <p:sp>
+        <p:nvSpPr>
+          <p:cNvPr id="237" name="Google Shape;237;g442eb61d9d_0_43:notes"/>
+          <p:cNvSpPr txBox="1">
+            <a:spLocks noGrp="1"/>
+          </p:cNvSpPr>
+          <p:nvPr>
+            <p:ph type="body" idx="1"/>
+          </p:nvPr>
+        </p:nvSpPr>
+        <p:spPr>
+          <a:xfrm>
+            <a:off x="685800" y="4343400"/>
+            <a:ext cx="5486400" cy="4114800"/>
+          </a:xfrm>
+          <a:prstGeom prst="rect">
+            <a:avLst/>
+          </a:prstGeom>
+        </p:spPr>
+        <p:txBody>
+          <a:bodyPr spcFirstLastPara="1" wrap="square" lIns="91425" tIns="91425" rIns="91425" bIns="91425" anchor="t" anchorCtr="0">
+            <a:noAutofit/>
+          </a:bodyPr>
+          <a:lstStyle/>
+          <a:p>
+            <a:pPr marL="0" lvl="0" indent="0" algn="l" rtl="0">
+              <a:spcBef>
+                <a:spcPts val="0"/>
+              </a:spcBef>
+              <a:spcAft>
+                <a:spcPts val="0"/>
+              </a:spcAft>
+              <a:buNone/>
+            </a:pPr>
+            <a:r>
+              <a:rPr lang="ru-RU" dirty="0" smtClean="0"/>
+              <a:t>Слайд 21. Заключение</a:t>
+            </a:r>
+          </a:p>
+          <a:p>
+            <a:pPr marL="0" lvl="0" indent="0" algn="l" rtl="0">
+              <a:spcBef>
+                <a:spcPts val="0"/>
+              </a:spcBef>
+              <a:spcAft>
+                <a:spcPts val="0"/>
+              </a:spcAft>
+              <a:buNone/>
+            </a:pPr>
+            <a:endParaRPr lang="ru-RU" dirty="0" smtClean="0"/>
+          </a:p>
+          <a:p>
+            <a:pPr marL="0" lvl="0" indent="0" algn="l" rtl="0">
+              <a:spcBef>
+                <a:spcPts val="0"/>
+              </a:spcBef>
+              <a:spcAft>
+                <a:spcPts val="0"/>
+              </a:spcAft>
+              <a:buNone/>
+            </a:pPr>
+            <a:r>
+              <a:rPr lang="ru-RU" dirty="0" smtClean="0"/>
+              <a:t>Разработано ПО, которое соответствует всем заявленным требованиям: </a:t>
+            </a:r>
+          </a:p>
+          <a:p>
+            <a:pPr marL="0" lvl="0" indent="0" algn="l" rtl="0">
+              <a:spcBef>
+                <a:spcPts val="0"/>
+              </a:spcBef>
+              <a:spcAft>
+                <a:spcPts val="0"/>
+              </a:spcAft>
+              <a:buNone/>
+            </a:pPr>
+            <a:r>
+              <a:rPr lang="ru-RU" dirty="0" smtClean="0"/>
+              <a:t>- пользовательский интерфейс интуитивно понятен;</a:t>
+            </a:r>
+          </a:p>
+          <a:p>
+            <a:pPr marL="0" lvl="0" indent="0" algn="l" rtl="0">
+              <a:spcBef>
+                <a:spcPts val="0"/>
+              </a:spcBef>
+              <a:spcAft>
+                <a:spcPts val="0"/>
+              </a:spcAft>
+              <a:buNone/>
+            </a:pPr>
+            <a:r>
+              <a:rPr lang="ru-RU" dirty="0" smtClean="0"/>
+              <a:t>- успешный обмен данными с сервером по HTTP API; </a:t>
+            </a:r>
+          </a:p>
+          <a:p>
+            <a:pPr marL="0" lvl="0" indent="0" algn="l" rtl="0">
+              <a:spcBef>
+                <a:spcPts val="0"/>
+              </a:spcBef>
+              <a:spcAft>
+                <a:spcPts val="0"/>
+              </a:spcAft>
+              <a:buNone/>
+            </a:pPr>
+            <a:r>
+              <a:rPr lang="ru-RU" dirty="0" smtClean="0"/>
+              <a:t>- использован современный стек WEB-разработчика, в составе которого находятся Angular, </a:t>
+            </a:r>
+            <a:r>
+              <a:rPr lang="ru-RU" dirty="0" err="1" smtClean="0"/>
+              <a:t>TypeScript</a:t>
+            </a:r>
+            <a:r>
+              <a:rPr lang="ru-RU" dirty="0" smtClean="0"/>
+              <a:t>, HTML, CSS и прочие технологии.</a:t>
+            </a:r>
+          </a:p>
+          <a:p>
+            <a:pPr marL="0" lvl="0" indent="0" algn="l" rtl="0">
+              <a:spcBef>
+                <a:spcPts val="0"/>
+              </a:spcBef>
+              <a:spcAft>
+                <a:spcPts val="0"/>
+              </a:spcAft>
+              <a:buNone/>
+            </a:pPr>
+            <a:endParaRPr lang="ru-RU" dirty="0" smtClean="0"/>
+          </a:p>
+          <a:p>
+            <a:pPr marL="0" lvl="0" indent="0" algn="l" rtl="0">
+              <a:spcBef>
+                <a:spcPts val="0"/>
+              </a:spcBef>
+              <a:spcAft>
+                <a:spcPts val="0"/>
+              </a:spcAft>
+              <a:buNone/>
+            </a:pPr>
+            <a:r>
+              <a:rPr lang="ru-RU" dirty="0" smtClean="0"/>
+              <a:t>Разработанное ПО было успешно протестировано.</a:t>
+            </a:r>
+          </a:p>
+          <a:p>
+            <a:pPr marL="0" lvl="0" indent="0" algn="l" rtl="0">
+              <a:spcBef>
+                <a:spcPts val="0"/>
+              </a:spcBef>
+              <a:spcAft>
+                <a:spcPts val="0"/>
+              </a:spcAft>
+              <a:buNone/>
+            </a:pPr>
+            <a:endParaRPr dirty="0"/>
+          </a:p>
+        </p:txBody>
+      </p:sp>
+    </p:spTree>
+    <p:extLst>
+      <p:ext uri="{BB962C8B-B14F-4D97-AF65-F5344CB8AC3E}">
+        <p14:creationId xmlns:p14="http://schemas.microsoft.com/office/powerpoint/2010/main" val="1748076789"/>
       </p:ext>
     </p:extLst>
   </p:cSld>
@@ -2002,7 +3000,96 @@
               </a:spcAft>
               <a:buNone/>
             </a:pPr>
-            <a:endParaRPr/>
+            <a:r>
+              <a:rPr lang="ru-RU" dirty="0" smtClean="0"/>
+              <a:t>Слайд 4. </a:t>
+            </a:r>
+            <a:r>
+              <a:rPr lang="en-US" dirty="0" smtClean="0"/>
+              <a:t>SLA-</a:t>
+            </a:r>
+            <a:r>
+              <a:rPr lang="ru-RU" dirty="0" smtClean="0"/>
+              <a:t>мониторинг</a:t>
+            </a:r>
+          </a:p>
+          <a:p>
+            <a:pPr marL="0" lvl="0" indent="0" algn="l" rtl="0">
+              <a:spcBef>
+                <a:spcPts val="0"/>
+              </a:spcBef>
+              <a:spcAft>
+                <a:spcPts val="0"/>
+              </a:spcAft>
+              <a:buNone/>
+            </a:pPr>
+            <a:endParaRPr lang="ru-RU" dirty="0" smtClean="0"/>
+          </a:p>
+          <a:p>
+            <a:pPr marL="0" lvl="0" indent="0" algn="l" rtl="0">
+              <a:spcBef>
+                <a:spcPts val="0"/>
+              </a:spcBef>
+              <a:spcAft>
+                <a:spcPts val="0"/>
+              </a:spcAft>
+              <a:buNone/>
+            </a:pPr>
+            <a:r>
+              <a:rPr lang="ru-RU" dirty="0" smtClean="0"/>
+              <a:t>SLA-агент – механизм диагностики состояния сети на стороне конечного пользователя. Его задача заключается в периодической отправке статистических данных, собранных устройством с системных счетчиков, а также результатов проверки доступности заранее заданных узлов.</a:t>
+            </a:r>
+          </a:p>
+          <a:p>
+            <a:pPr marL="0" lvl="0" indent="0" algn="l" rtl="0">
+              <a:spcBef>
+                <a:spcPts val="0"/>
+              </a:spcBef>
+              <a:spcAft>
+                <a:spcPts val="0"/>
+              </a:spcAft>
+              <a:buNone/>
+            </a:pPr>
+            <a:endParaRPr lang="ru-RU" dirty="0" smtClean="0"/>
+          </a:p>
+          <a:p>
+            <a:pPr marL="0" lvl="0" indent="0" algn="l" rtl="0">
+              <a:spcBef>
+                <a:spcPts val="0"/>
+              </a:spcBef>
+              <a:spcAft>
+                <a:spcPts val="0"/>
+              </a:spcAft>
+              <a:buNone/>
+            </a:pPr>
+            <a:r>
+              <a:rPr lang="ru-RU" dirty="0" smtClean="0"/>
+              <a:t>Данный вид контроля сети состоит из двух модулей: агент, устанавливаемый на оборудование и сервер, обрабатывающий информацию.</a:t>
+            </a:r>
+          </a:p>
+          <a:p>
+            <a:pPr marL="0" lvl="0" indent="0" algn="l" rtl="0">
+              <a:spcBef>
+                <a:spcPts val="0"/>
+              </a:spcBef>
+              <a:spcAft>
+                <a:spcPts val="0"/>
+              </a:spcAft>
+              <a:buNone/>
+            </a:pPr>
+            <a:endParaRPr lang="ru-RU" dirty="0" smtClean="0"/>
+          </a:p>
+          <a:p>
+            <a:pPr marL="0" lvl="0" indent="0" algn="l" rtl="0">
+              <a:spcBef>
+                <a:spcPts val="0"/>
+              </a:spcBef>
+              <a:spcAft>
+                <a:spcPts val="0"/>
+              </a:spcAft>
+              <a:buNone/>
+            </a:pPr>
+            <a:endParaRPr dirty="0"/>
           </a:p>
         </p:txBody>
       </p:sp>
@@ -2111,7 +3198,80 @@
               </a:spcAft>
               <a:buNone/>
             </a:pPr>
-            <a:endParaRPr/>
+            <a:r>
+              <a:rPr lang="ru-RU" dirty="0" smtClean="0"/>
+              <a:t>Слайд 5. </a:t>
+            </a:r>
+            <a:r>
+              <a:rPr lang="ru-RU" sz="1100" dirty="0" smtClean="0"/>
+              <a:t>Пример использования</a:t>
+            </a:r>
+          </a:p>
+          <a:p>
+            <a:pPr marL="0" lvl="0" indent="0" algn="l" rtl="0">
+              <a:spcBef>
+                <a:spcPts val="0"/>
+              </a:spcBef>
+              <a:spcAft>
+                <a:spcPts val="0"/>
+              </a:spcAft>
+              <a:buNone/>
+            </a:pPr>
+            <a:endParaRPr lang="ru-RU" sz="1100" dirty="0" smtClean="0"/>
+          </a:p>
+          <a:p>
+            <a:pPr marL="0" lvl="0" indent="0" algn="l" rtl="0">
+              <a:spcBef>
+                <a:spcPts val="0"/>
+              </a:spcBef>
+              <a:spcAft>
+                <a:spcPts val="0"/>
+              </a:spcAft>
+              <a:buNone/>
+            </a:pPr>
+            <a:r>
+              <a:rPr lang="ru-RU" dirty="0" smtClean="0"/>
+              <a:t>При подключении домашнего интернета мастер выполняет первоначальную настройку оборудования в локальной сети пользователя. </a:t>
+            </a:r>
+          </a:p>
+          <a:p>
+            <a:pPr marL="0" lvl="0" indent="0" algn="l" rtl="0">
+              <a:spcBef>
+                <a:spcPts val="0"/>
+              </a:spcBef>
+              <a:spcAft>
+                <a:spcPts val="0"/>
+              </a:spcAft>
+              <a:buNone/>
+            </a:pPr>
+            <a:endParaRPr lang="ru-RU" dirty="0" smtClean="0"/>
+          </a:p>
+          <a:p>
+            <a:pPr marL="0" lvl="0" indent="0" algn="l" rtl="0">
+              <a:spcBef>
+                <a:spcPts val="0"/>
+              </a:spcBef>
+              <a:spcAft>
+                <a:spcPts val="0"/>
+              </a:spcAft>
+              <a:buNone/>
+            </a:pPr>
+            <a:r>
+              <a:rPr lang="ru-RU" dirty="0" smtClean="0"/>
+              <a:t>В дальнейшем, в случае возникновения неполадок на стороне пользователя необходимость повторного вызова специалиста пропадает, так как мониторинг сети, выявление и устранение проблем в локальной сети пользователя можно осуществить удалённо.</a:t>
+            </a:r>
+          </a:p>
+          <a:p>
+            <a:pPr marL="0" lvl="0" indent="0" algn="l" rtl="0">
+              <a:spcBef>
+                <a:spcPts val="0"/>
+              </a:spcBef>
+              <a:spcAft>
+                <a:spcPts val="0"/>
+              </a:spcAft>
+              <a:buNone/>
+            </a:pPr>
+            <a:endParaRPr dirty="0"/>
           </a:p>
         </p:txBody>
       </p:sp>
@@ -2220,7 +3380,133 @@
               </a:spcAft>
               <a:buNone/>
             </a:pPr>
-            <a:endParaRPr/>
+            <a:r>
+              <a:rPr lang="ru-RU" dirty="0" smtClean="0"/>
+              <a:t>Слайд 6. Постановка задачи</a:t>
+            </a:r>
+          </a:p>
+          <a:p>
+            <a:pPr marL="0" lvl="0" indent="0" algn="l" rtl="0">
+              <a:spcBef>
+                <a:spcPts val="0"/>
+              </a:spcBef>
+              <a:spcAft>
+                <a:spcPts val="0"/>
+              </a:spcAft>
+              <a:buNone/>
+            </a:pPr>
+            <a:endParaRPr lang="ru-RU" dirty="0" smtClean="0"/>
+          </a:p>
+          <a:p>
+            <a:pPr marL="0" lvl="0" indent="0" algn="l" rtl="0">
+              <a:spcBef>
+                <a:spcPts val="0"/>
+              </a:spcBef>
+              <a:spcAft>
+                <a:spcPts val="0"/>
+              </a:spcAft>
+              <a:buNone/>
+            </a:pPr>
+            <a:r>
+              <a:rPr lang="ru-RU" dirty="0" smtClean="0"/>
+              <a:t>Пункты, необходимые для функционирования системы дистанционного мониторинга:</a:t>
+            </a:r>
+          </a:p>
+          <a:p>
+            <a:pPr marL="0" lvl="0" indent="0" algn="l" rtl="0">
+              <a:spcBef>
+                <a:spcPts val="0"/>
+              </a:spcBef>
+              <a:spcAft>
+                <a:spcPts val="0"/>
+              </a:spcAft>
+              <a:buNone/>
+            </a:pPr>
+            <a:r>
+              <a:rPr lang="ru-RU" dirty="0" smtClean="0"/>
+              <a:t>- сбор статистических данных;</a:t>
+            </a:r>
+          </a:p>
+          <a:p>
+            <a:pPr marL="0" lvl="0" indent="0" algn="l" rtl="0">
+              <a:spcBef>
+                <a:spcPts val="0"/>
+              </a:spcBef>
+              <a:spcAft>
+                <a:spcPts val="0"/>
+              </a:spcAft>
+              <a:buNone/>
+            </a:pPr>
+            <a:r>
+              <a:rPr lang="ru-RU" dirty="0" smtClean="0"/>
+              <a:t>- отправка данных на сервер;</a:t>
+            </a:r>
+          </a:p>
+          <a:p>
+            <a:pPr marL="0" lvl="0" indent="0" algn="l" rtl="0">
+              <a:spcBef>
+                <a:spcPts val="0"/>
+              </a:spcBef>
+              <a:spcAft>
+                <a:spcPts val="0"/>
+              </a:spcAft>
+              <a:buNone/>
+            </a:pPr>
+            <a:r>
+              <a:rPr lang="ru-RU" dirty="0" smtClean="0"/>
+              <a:t>- вывод необходимых данных оператору через web.</a:t>
+            </a:r>
+          </a:p>
+          <a:p>
+            <a:pPr marL="0" lvl="0" indent="0" algn="l" rtl="0">
+              <a:spcBef>
+                <a:spcPts val="0"/>
+              </a:spcBef>
+              <a:spcAft>
+                <a:spcPts val="0"/>
+              </a:spcAft>
+              <a:buNone/>
+            </a:pPr>
+            <a:endParaRPr lang="ru-RU" dirty="0" smtClean="0"/>
+          </a:p>
+          <a:p>
+            <a:pPr marL="0" lvl="0" indent="0" algn="l" rtl="0">
+              <a:spcBef>
+                <a:spcPts val="0"/>
+              </a:spcBef>
+              <a:spcAft>
+                <a:spcPts val="0"/>
+              </a:spcAft>
+              <a:buNone/>
+            </a:pPr>
+            <a:r>
+              <a:rPr lang="ru-RU" dirty="0" smtClean="0"/>
+              <a:t>Цель текущей ВКР – разработка пользовательского web-интерфейса для взаимодействия оператора ПО с сервером.</a:t>
+            </a:r>
+          </a:p>
+          <a:p>
+            <a:pPr marL="0" lvl="0" indent="0" algn="l" rtl="0">
+              <a:spcBef>
+                <a:spcPts val="0"/>
+              </a:spcBef>
+              <a:spcAft>
+                <a:spcPts val="0"/>
+              </a:spcAft>
+              <a:buNone/>
+            </a:pPr>
+            <a:endParaRPr lang="ru-RU" dirty="0" smtClean="0"/>
+          </a:p>
+          <a:p>
+            <a:pPr marL="0" lvl="0" indent="0" algn="l" rtl="0">
+              <a:spcBef>
+                <a:spcPts val="0"/>
+              </a:spcBef>
+              <a:spcAft>
+                <a:spcPts val="0"/>
+              </a:spcAft>
+              <a:buNone/>
+            </a:pPr>
+            <a:endParaRPr dirty="0"/>
           </a:p>
         </p:txBody>
       </p:sp>
@@ -2329,7 +3615,76 @@
               </a:spcAft>
               <a:buNone/>
             </a:pPr>
-            <a:endParaRPr/>
+            <a:r>
+              <a:rPr lang="ru-RU" dirty="0" smtClean="0"/>
+              <a:t>Слайд 7. Обзор аналогов</a:t>
+            </a:r>
+          </a:p>
+          <a:p>
+            <a:pPr marL="0" lvl="0" indent="0" algn="l" rtl="0">
+              <a:spcBef>
+                <a:spcPts val="0"/>
+              </a:spcBef>
+              <a:spcAft>
+                <a:spcPts val="0"/>
+              </a:spcAft>
+              <a:buNone/>
+            </a:pPr>
+            <a:endParaRPr lang="ru-RU" dirty="0" smtClean="0"/>
+          </a:p>
+          <a:p>
+            <a:pPr marL="0" lvl="0" indent="0" algn="l" rtl="0">
+              <a:spcBef>
+                <a:spcPts val="0"/>
+              </a:spcBef>
+              <a:spcAft>
+                <a:spcPts val="0"/>
+              </a:spcAft>
+              <a:buNone/>
+            </a:pPr>
+            <a:r>
+              <a:rPr lang="ru-RU" dirty="0" smtClean="0"/>
+              <a:t>Естественно, на мировом рынке сетевого оборудования имеются конкуренты – комплексы программных и аппаратных средств. ПО для решения поставленных задач может устанавливаться на оборудование заводом-изготовителем, а может приобретаться отдельно.</a:t>
+            </a:r>
+          </a:p>
+          <a:p>
+            <a:pPr marL="0" lvl="0" indent="0" algn="l" rtl="0">
+              <a:spcBef>
+                <a:spcPts val="0"/>
+              </a:spcBef>
+              <a:spcAft>
+                <a:spcPts val="0"/>
+              </a:spcAft>
+              <a:buNone/>
+            </a:pPr>
+            <a:endParaRPr lang="ru-RU" dirty="0" smtClean="0"/>
+          </a:p>
+          <a:p>
+            <a:pPr marL="0" lvl="0" indent="0" algn="l" rtl="0">
+              <a:spcBef>
+                <a:spcPts val="0"/>
+              </a:spcBef>
+              <a:spcAft>
+                <a:spcPts val="0"/>
+              </a:spcAft>
+              <a:buNone/>
+            </a:pPr>
+            <a:r>
+              <a:rPr lang="ru-RU" dirty="0" smtClean="0"/>
+              <a:t>Однако каждый аналог имеет набор как и собственных преимуществ, так и недостатков.</a:t>
+            </a:r>
+          </a:p>
+          <a:p>
+            <a:pPr marL="0" lvl="0" indent="0" algn="l" rtl="0">
+              <a:spcBef>
+                <a:spcPts val="0"/>
+              </a:spcBef>
+              <a:spcAft>
+                <a:spcPts val="0"/>
+              </a:spcAft>
+              <a:buNone/>
+            </a:pPr>
+            <a:endParaRPr dirty="0"/>
           </a:p>
         </p:txBody>
       </p:sp>
@@ -2438,7 +3793,160 @@
               </a:spcAft>
               <a:buNone/>
             </a:pPr>
-            <a:endParaRPr/>
+            <a:r>
+              <a:rPr lang="ru-RU" dirty="0" smtClean="0"/>
+              <a:t>Слайд</a:t>
+            </a:r>
+            <a:r>
+              <a:rPr lang="ru-RU" baseline="0" dirty="0" smtClean="0"/>
+              <a:t> 8. </a:t>
+            </a:r>
+            <a:r>
+              <a:rPr lang="en-US" sz="1100" dirty="0" smtClean="0"/>
+              <a:t>Cisco IP SLA Monitor</a:t>
+            </a:r>
+            <a:endParaRPr lang="ru-RU" sz="1100" dirty="0" smtClean="0"/>
+          </a:p>
+          <a:p>
+            <a:pPr marL="0" lvl="0" indent="0" algn="l" rtl="0">
+              <a:spcBef>
+                <a:spcPts val="0"/>
+              </a:spcBef>
+              <a:spcAft>
+                <a:spcPts val="0"/>
+              </a:spcAft>
+              <a:buNone/>
+            </a:pPr>
+            <a:endParaRPr lang="ru-RU" sz="1100" dirty="0" smtClean="0"/>
+          </a:p>
+          <a:p>
+            <a:pPr marL="0" lvl="0" indent="0" algn="l" rtl="0">
+              <a:spcBef>
+                <a:spcPts val="0"/>
+              </a:spcBef>
+              <a:spcAft>
+                <a:spcPts val="0"/>
+              </a:spcAft>
+              <a:buNone/>
+            </a:pPr>
+            <a:r>
+              <a:rPr lang="ru-RU" sz="1100" dirty="0" smtClean="0"/>
+              <a:t>Достоинства:</a:t>
+            </a:r>
+          </a:p>
+          <a:p>
+            <a:pPr marL="0" lvl="0" indent="0" algn="l" rtl="0">
+              <a:spcBef>
+                <a:spcPts val="0"/>
+              </a:spcBef>
+              <a:spcAft>
+                <a:spcPts val="0"/>
+              </a:spcAft>
+              <a:buNone/>
+            </a:pPr>
+            <a:r>
+              <a:rPr lang="ru-RU" sz="1100" dirty="0" smtClean="0"/>
+              <a:t>- предустановлено заводом на оборудовании;</a:t>
+            </a:r>
+          </a:p>
+          <a:p>
+            <a:pPr marL="0" lvl="0" indent="0" algn="l" rtl="0">
+              <a:spcBef>
+                <a:spcPts val="0"/>
+              </a:spcBef>
+              <a:spcAft>
+                <a:spcPts val="0"/>
+              </a:spcAft>
+              <a:buNone/>
+            </a:pPr>
+            <a:r>
+              <a:rPr lang="ru-RU" sz="1100" dirty="0" smtClean="0"/>
+              <a:t>- высшее качество;</a:t>
+            </a:r>
+          </a:p>
+          <a:p>
+            <a:pPr marL="0" lvl="0" indent="0" algn="l" rtl="0">
+              <a:spcBef>
+                <a:spcPts val="0"/>
+              </a:spcBef>
+              <a:spcAft>
+                <a:spcPts val="0"/>
+              </a:spcAft>
+              <a:buNone/>
+            </a:pPr>
+            <a:r>
+              <a:rPr lang="ru-RU" sz="1100" dirty="0" smtClean="0"/>
+              <a:t>- поддержка.</a:t>
+            </a:r>
+          </a:p>
+          <a:p>
+            <a:pPr marL="0" lvl="0" indent="0" algn="l" rtl="0">
+              <a:spcBef>
+                <a:spcPts val="0"/>
+              </a:spcBef>
+              <a:spcAft>
+                <a:spcPts val="0"/>
+              </a:spcAft>
+              <a:buNone/>
+            </a:pPr>
+            <a:endParaRPr lang="ru-RU" sz="1100" dirty="0" smtClean="0"/>
+          </a:p>
+          <a:p>
+            <a:pPr marL="0" lvl="0" indent="0" algn="l" rtl="0">
+              <a:spcBef>
+                <a:spcPts val="0"/>
+              </a:spcBef>
+              <a:spcAft>
+                <a:spcPts val="0"/>
+              </a:spcAft>
+              <a:buNone/>
+            </a:pPr>
+            <a:r>
+              <a:rPr lang="ru-RU" sz="1100" dirty="0" smtClean="0"/>
+              <a:t>Недостатки:</a:t>
+            </a:r>
+          </a:p>
+          <a:p>
+            <a:pPr marL="0" lvl="0" indent="0" algn="l" rtl="0">
+              <a:spcBef>
+                <a:spcPts val="0"/>
+              </a:spcBef>
+              <a:spcAft>
+                <a:spcPts val="0"/>
+              </a:spcAft>
+              <a:buNone/>
+            </a:pPr>
+            <a:r>
+              <a:rPr lang="ru-RU" sz="1100" dirty="0" smtClean="0"/>
+              <a:t>- высокая цена оборудования.</a:t>
+            </a:r>
+          </a:p>
+          <a:p>
+            <a:pPr marL="0" lvl="0" indent="0" algn="l" rtl="0">
+              <a:spcBef>
+                <a:spcPts val="0"/>
+              </a:spcBef>
+              <a:spcAft>
+                <a:spcPts val="0"/>
+              </a:spcAft>
+              <a:buNone/>
+            </a:pPr>
+            <a:endParaRPr lang="ru-RU" sz="1100" dirty="0" smtClean="0"/>
+          </a:p>
+          <a:p>
+            <a:pPr marL="0" lvl="0" indent="0" algn="l" rtl="0">
+              <a:spcBef>
+                <a:spcPts val="0"/>
+              </a:spcBef>
+              <a:spcAft>
+                <a:spcPts val="0"/>
+              </a:spcAft>
+              <a:buNone/>
+            </a:pPr>
+            <a:r>
+              <a:rPr lang="ru-RU" sz="1100" dirty="0" smtClean="0"/>
+              <a:t>Пример пользовательского интерфейса.</a:t>
+            </a:r>
           </a:p>
         </p:txBody>
       </p:sp>
@@ -2547,7 +4055,207 @@
               </a:spcAft>
               <a:buNone/>
             </a:pPr>
-            <a:endParaRPr/>
+            <a:r>
+              <a:rPr lang="ru-RU" sz="1100" dirty="0" smtClean="0"/>
+              <a:t>Слайд</a:t>
+            </a:r>
+            <a:r>
+              <a:rPr lang="ru-RU" sz="1100" baseline="0" dirty="0" smtClean="0"/>
+              <a:t> 8. </a:t>
+            </a:r>
+            <a:r>
+              <a:rPr lang="en-US" sz="1100" dirty="0" smtClean="0"/>
+              <a:t>PRTG Network Monitor</a:t>
+            </a:r>
+            <a:endParaRPr lang="ru-RU" sz="1100" dirty="0" smtClean="0"/>
+          </a:p>
+          <a:p>
+            <a:pPr marL="0" lvl="0" indent="0" algn="l" rtl="0">
+              <a:spcBef>
+                <a:spcPts val="0"/>
+              </a:spcBef>
+              <a:spcAft>
+                <a:spcPts val="0"/>
+              </a:spcAft>
+              <a:buNone/>
+            </a:pPr>
+            <a:endParaRPr lang="ru-RU" sz="1100" dirty="0" smtClean="0"/>
+          </a:p>
+          <a:p>
+            <a:pPr marL="0" lvl="0" indent="0" algn="l" rtl="0">
+              <a:spcBef>
+                <a:spcPts val="0"/>
+              </a:spcBef>
+              <a:spcAft>
+                <a:spcPts val="0"/>
+              </a:spcAft>
+              <a:buNone/>
+            </a:pPr>
+            <a:r>
+              <a:rPr lang="ru-RU" dirty="0" smtClean="0"/>
+              <a:t>Достоинства:</a:t>
+            </a:r>
+          </a:p>
+          <a:p>
+            <a:pPr marL="0" lvl="0" indent="0" algn="l" rtl="0">
+              <a:spcBef>
+                <a:spcPts val="0"/>
+              </a:spcBef>
+              <a:spcAft>
+                <a:spcPts val="0"/>
+              </a:spcAft>
+              <a:buNone/>
+            </a:pPr>
+            <a:r>
+              <a:rPr lang="ru-RU" dirty="0" smtClean="0"/>
+              <a:t>-</a:t>
+            </a:r>
+            <a:r>
+              <a:rPr lang="ru-RU" baseline="0" dirty="0" smtClean="0"/>
+              <a:t> </a:t>
+            </a:r>
+            <a:r>
+              <a:rPr lang="ru-RU" dirty="0" smtClean="0"/>
+              <a:t>гибкий набор функционала;</a:t>
+            </a:r>
+          </a:p>
+          <a:p>
+            <a:pPr marL="0" lvl="0" indent="0" algn="l" rtl="0">
+              <a:spcBef>
+                <a:spcPts val="0"/>
+              </a:spcBef>
+              <a:spcAft>
+                <a:spcPts val="0"/>
+              </a:spcAft>
+              <a:buNone/>
+            </a:pPr>
+            <a:r>
+              <a:rPr lang="ru-RU" dirty="0" smtClean="0"/>
+              <a:t>- вариации цен;</a:t>
+            </a:r>
+          </a:p>
+          <a:p>
+            <a:pPr marL="0" lvl="0" indent="0" algn="l" rtl="0">
+              <a:spcBef>
+                <a:spcPts val="0"/>
+              </a:spcBef>
+              <a:spcAft>
+                <a:spcPts val="0"/>
+              </a:spcAft>
+              <a:buNone/>
+            </a:pPr>
+            <a:r>
+              <a:rPr lang="ru-RU" dirty="0" smtClean="0"/>
+              <a:t>- поддержка.</a:t>
+            </a:r>
+          </a:p>
+          <a:p>
+            <a:pPr marL="0" lvl="0" indent="0" algn="l" rtl="0">
+              <a:spcBef>
+                <a:spcPts val="0"/>
+              </a:spcBef>
+              <a:spcAft>
+                <a:spcPts val="0"/>
+              </a:spcAft>
+              <a:buNone/>
+            </a:pPr>
+            <a:endParaRPr lang="ru-RU" dirty="0" smtClean="0"/>
+          </a:p>
+          <a:p>
+            <a:pPr marL="0" lvl="0" indent="0" algn="l" rtl="0">
+              <a:spcBef>
+                <a:spcPts val="0"/>
+              </a:spcBef>
+              <a:spcAft>
+                <a:spcPts val="0"/>
+              </a:spcAft>
+              <a:buNone/>
+            </a:pPr>
+            <a:r>
+              <a:rPr lang="ru-RU" dirty="0" smtClean="0"/>
+              <a:t>Недостатки:</a:t>
+            </a:r>
+          </a:p>
+          <a:p>
+            <a:pPr marL="0" lvl="0" indent="0" algn="l" rtl="0">
+              <a:spcBef>
+                <a:spcPts val="0"/>
+              </a:spcBef>
+              <a:spcAft>
+                <a:spcPts val="0"/>
+              </a:spcAft>
+              <a:buNone/>
+            </a:pPr>
+            <a:r>
+              <a:rPr lang="ru-RU" dirty="0" smtClean="0"/>
+              <a:t>- приобретается отдельно;</a:t>
+            </a:r>
+          </a:p>
+          <a:p>
+            <a:pPr marL="0" lvl="0" indent="0" algn="l" rtl="0">
+              <a:spcBef>
+                <a:spcPts val="0"/>
+              </a:spcBef>
+              <a:spcAft>
+                <a:spcPts val="0"/>
+              </a:spcAft>
+              <a:buNone/>
+            </a:pPr>
+            <a:r>
+              <a:rPr lang="ru-RU" dirty="0" smtClean="0"/>
+              <a:t>- высокая цена сенсоров.</a:t>
+            </a:r>
+          </a:p>
+          <a:p>
+            <a:pPr marL="0" lvl="0" indent="0" algn="l" rtl="0">
+              <a:spcBef>
+                <a:spcPts val="0"/>
+              </a:spcBef>
+              <a:spcAft>
+                <a:spcPts val="0"/>
+              </a:spcAft>
+              <a:buNone/>
+            </a:pPr>
+            <a:endParaRPr lang="ru-RU" sz="1100" dirty="0" smtClean="0"/>
+          </a:p>
+          <a:p>
+            <a:pPr marL="0" lvl="0" indent="0" algn="l" rtl="0">
+              <a:spcBef>
+                <a:spcPts val="0"/>
+              </a:spcBef>
+              <a:spcAft>
+                <a:spcPts val="0"/>
+              </a:spcAft>
+              <a:buNone/>
+            </a:pPr>
+            <a:r>
+              <a:rPr lang="ru-RU" sz="1100" dirty="0" smtClean="0"/>
+              <a:t>Пример пользовательского интерфейса.</a:t>
+            </a:r>
+          </a:p>
+          <a:p>
+            <a:pPr marL="0" lvl="0" indent="0" algn="l" rtl="0">
+              <a:spcBef>
+                <a:spcPts val="0"/>
+              </a:spcBef>
+              <a:spcAft>
+                <a:spcPts val="0"/>
+              </a:spcAft>
+              <a:buNone/>
+            </a:pPr>
+            <a:endParaRPr lang="ru-RU" dirty="0" smtClean="0"/>
+          </a:p>
+          <a:p>
+            <a:pPr marL="0" lvl="0" indent="0" algn="l" rtl="0">
+              <a:spcBef>
+                <a:spcPts val="0"/>
+              </a:spcBef>
+              <a:spcAft>
+                <a:spcPts val="0"/>
+              </a:spcAft>
+              <a:buNone/>
+            </a:pPr>
+            <a:endParaRPr dirty="0"/>
           </a:p>
         </p:txBody>
       </p:sp>
@@ -2656,7 +4364,172 @@
               </a:spcAft>
               <a:buNone/>
             </a:pPr>
-            <a:endParaRPr/>
+            <a:r>
+              <a:rPr lang="ru-RU" sz="1100" dirty="0" smtClean="0"/>
+              <a:t>Слайд 10.</a:t>
+            </a:r>
+            <a:r>
+              <a:rPr lang="ru-RU" sz="1100" baseline="0" dirty="0" smtClean="0"/>
+              <a:t> </a:t>
+            </a:r>
+            <a:r>
+              <a:rPr lang="en-US" sz="1100" dirty="0" smtClean="0"/>
+              <a:t>SLAMON Online</a:t>
+            </a:r>
+            <a:endParaRPr lang="ru-RU" sz="1100" dirty="0" smtClean="0"/>
+          </a:p>
+          <a:p>
+            <a:pPr marL="0" lvl="0" indent="0" algn="l" rtl="0">
+              <a:spcBef>
+                <a:spcPts val="0"/>
+              </a:spcBef>
+              <a:spcAft>
+                <a:spcPts val="0"/>
+              </a:spcAft>
+              <a:buNone/>
+            </a:pPr>
+            <a:endParaRPr lang="ru-RU" sz="1100" dirty="0" smtClean="0"/>
+          </a:p>
+          <a:p>
+            <a:pPr marL="0" lvl="0" indent="0" algn="l" rtl="0">
+              <a:spcBef>
+                <a:spcPts val="0"/>
+              </a:spcBef>
+              <a:spcAft>
+                <a:spcPts val="0"/>
+              </a:spcAft>
+              <a:buNone/>
+            </a:pPr>
+            <a:r>
+              <a:rPr lang="ru-RU" sz="1100" dirty="0" smtClean="0"/>
+              <a:t>Достоинства:</a:t>
+            </a:r>
+          </a:p>
+          <a:p>
+            <a:pPr marL="0" lvl="0" indent="0" algn="l" rtl="0">
+              <a:spcBef>
+                <a:spcPts val="0"/>
+              </a:spcBef>
+              <a:spcAft>
+                <a:spcPts val="0"/>
+              </a:spcAft>
+              <a:buNone/>
+            </a:pPr>
+            <a:r>
+              <a:rPr lang="ru-RU" sz="1100" dirty="0" smtClean="0"/>
+              <a:t>- поддержка на Русском;</a:t>
+            </a:r>
+          </a:p>
+          <a:p>
+            <a:pPr marL="0" lvl="0" indent="0" algn="l" rtl="0">
+              <a:spcBef>
+                <a:spcPts val="0"/>
+              </a:spcBef>
+              <a:spcAft>
+                <a:spcPts val="0"/>
+              </a:spcAft>
+              <a:buNone/>
+            </a:pPr>
+            <a:r>
+              <a:rPr lang="ru-RU" sz="1100" dirty="0" smtClean="0"/>
+              <a:t>- адаптация под нужды клиента.</a:t>
+            </a:r>
+          </a:p>
+          <a:p>
+            <a:pPr marL="0" lvl="0" indent="0" algn="l" rtl="0">
+              <a:spcBef>
+                <a:spcPts val="0"/>
+              </a:spcBef>
+              <a:spcAft>
+                <a:spcPts val="0"/>
+              </a:spcAft>
+              <a:buNone/>
+            </a:pPr>
+            <a:endParaRPr lang="ru-RU" sz="1100" dirty="0" smtClean="0"/>
+          </a:p>
+          <a:p>
+            <a:pPr marL="0" lvl="0" indent="0" algn="l" rtl="0">
+              <a:spcBef>
+                <a:spcPts val="0"/>
+              </a:spcBef>
+              <a:spcAft>
+                <a:spcPts val="0"/>
+              </a:spcAft>
+              <a:buNone/>
+            </a:pPr>
+            <a:r>
+              <a:rPr lang="ru-RU" sz="1100" dirty="0" smtClean="0"/>
+              <a:t>Недостатки:</a:t>
+            </a:r>
+          </a:p>
+          <a:p>
+            <a:pPr marL="0" lvl="0" indent="0" algn="l" rtl="0">
+              <a:spcBef>
+                <a:spcPts val="0"/>
+              </a:spcBef>
+              <a:spcAft>
+                <a:spcPts val="0"/>
+              </a:spcAft>
+              <a:buNone/>
+            </a:pPr>
+            <a:r>
+              <a:rPr lang="ru-RU" sz="1100" dirty="0" smtClean="0"/>
+              <a:t>- приобретается отдельно;</a:t>
+            </a:r>
+          </a:p>
+          <a:p>
+            <a:pPr marL="0" lvl="0" indent="0" algn="l" rtl="0">
+              <a:spcBef>
+                <a:spcPts val="0"/>
+              </a:spcBef>
+              <a:spcAft>
+                <a:spcPts val="0"/>
+              </a:spcAft>
+              <a:buNone/>
+            </a:pPr>
+            <a:r>
+              <a:rPr lang="ru-RU" sz="1100" dirty="0" smtClean="0"/>
+              <a:t>- высокая цена услуг при увеличении масштабов.</a:t>
+            </a:r>
+          </a:p>
+          <a:p>
+            <a:pPr marL="0" lvl="0" indent="0" algn="l" rtl="0">
+              <a:spcBef>
+                <a:spcPts val="0"/>
+              </a:spcBef>
+              <a:spcAft>
+                <a:spcPts val="0"/>
+              </a:spcAft>
+              <a:buNone/>
+            </a:pPr>
+            <a:endParaRPr lang="ru-RU" sz="1100" dirty="0" smtClean="0"/>
+          </a:p>
+          <a:p>
+            <a:pPr marL="0" lvl="0" indent="0" algn="l" rtl="0">
+              <a:spcBef>
+                <a:spcPts val="0"/>
+              </a:spcBef>
+              <a:spcAft>
+                <a:spcPts val="0"/>
+              </a:spcAft>
+              <a:buNone/>
+            </a:pPr>
+            <a:r>
+              <a:rPr lang="ru-RU" sz="1100" dirty="0" smtClean="0"/>
+              <a:t>Пример пользовательского интерфейса.</a:t>
+            </a:r>
+          </a:p>
+          <a:p>
+            <a:pPr marL="0" lvl="0" indent="0" algn="l" rtl="0">
+              <a:spcBef>
+                <a:spcPts val="0"/>
+              </a:spcBef>
+              <a:spcAft>
+                <a:spcPts val="0"/>
+              </a:spcAft>
+              <a:buNone/>
+            </a:pPr>
+            <a:endParaRPr dirty="0"/>
           </a:p>
         </p:txBody>
       </p:sp>
@@ -9356,15 +11229,6 @@
               </a:rPr>
               <a:t>кроссплатформенность (адаптивная вёрстка);</a:t>
             </a:r>
-            <a:endParaRPr lang="ru-RU" sz="2000" b="1" dirty="0" smtClean="0">
-              <a:solidFill>
-                <a:schemeClr val="tx1"/>
-              </a:solidFill>
-              <a:latin typeface="Ubuntu"/>
-              <a:ea typeface="Ubuntu"/>
-              <a:cs typeface="Ubuntu"/>
-              <a:sym typeface="Ubuntu"/>
-            </a:endParaRPr>
           </a:p>
           <a:p>
             <a:pPr marL="342900" indent="-342900" algn="just"/>
@@ -9710,7 +11574,7 @@
           <p:nvPr/>
         </p:nvPicPr>
         <p:blipFill>
-          <a:blip r:embed="rId2">
+          <a:blip r:embed="rId3">
             <a:extLst>
               <a:ext uri="{28A0092B-C50C-407E-A947-70E740481C1C}">
                 <a14:useLocalDpi xmlns:a14="http://schemas.microsoft.com/office/drawing/2010/main" val="0"/>
@@ -9894,7 +11758,7 @@
           <p:nvPr/>
         </p:nvPicPr>
         <p:blipFill>
-          <a:blip r:embed="rId2">
+          <a:blip r:embed="rId3">
             <a:extLst>
               <a:ext uri="{28A0092B-C50C-407E-A947-70E740481C1C}">
                 <a14:useLocalDpi xmlns:a14="http://schemas.microsoft.com/office/drawing/2010/main" val="0"/>
@@ -9934,7 +11798,7 @@
           <p:nvPr/>
         </p:nvPicPr>
         <p:blipFill>
-          <a:blip r:embed="rId3">
+          <a:blip r:embed="rId4">
             <a:extLst>
               <a:ext uri="{28A0092B-C50C-407E-A947-70E740481C1C}">
                 <a14:useLocalDpi xmlns:a14="http://schemas.microsoft.com/office/drawing/2010/main" val="0"/>
@@ -9974,7 +11838,7 @@
           <p:nvPr/>
         </p:nvPicPr>
         <p:blipFill>
-          <a:blip r:embed="rId4">
+          <a:blip r:embed="rId5">
             <a:extLst>
               <a:ext uri="{28A0092B-C50C-407E-A947-70E740481C1C}">
                 <a14:useLocalDpi xmlns:a14="http://schemas.microsoft.com/office/drawing/2010/main" val="0"/>

</xml_diff>